<commit_message>
Minor changes to template and file name change of paper
</commit_message>
<xml_diff>
--- a/VASE Jonsson et al.pptx
+++ b/VASE Jonsson et al.pptx
@@ -613,22 +613,10 @@
                 <a:ea typeface="+mn-ea"/>
                 <a:cs typeface="+mn-cs"/>
               </a:rPr>
-              <a:t>, Leif, et al. </a:t>
+              <a:t>, Leif, et al. "Automated bug assignment: Ensemble-based machine learning in large scale industrial contexts." </a:t>
             </a:r>
             <a:r>
-              <a:rPr lang="en-US" sz="1100" b="0" i="0" kern="1200" smtClean="0">
-                <a:solidFill>
-                  <a:schemeClr val="tx1"/>
-                </a:solidFill>
-                <a:effectLst/>
-                <a:latin typeface="+mn-lt"/>
-                <a:ea typeface="+mn-ea"/>
-                <a:cs typeface="+mn-cs"/>
-              </a:rPr>
-              <a:t>"Automated bug assignment: Ensemble-based machine learning in large scale industrial contexts." </a:t>
-            </a:r>
-            <a:r>
-              <a:rPr lang="en-US" sz="1100" b="0" i="1" kern="1200" smtClean="0">
+              <a:rPr lang="en-US" sz="1100" b="0" i="1" kern="1200" dirty="0" smtClean="0">
                 <a:solidFill>
                   <a:schemeClr val="tx1"/>
                 </a:solidFill>
@@ -640,7 +628,7 @@
               <a:t>Empirical Software Engineering</a:t>
             </a:r>
             <a:r>
-              <a:rPr lang="en-US" sz="1100" b="0" i="0" kern="1200" smtClean="0">
+              <a:rPr lang="en-US" sz="1100" b="0" i="0" kern="1200" dirty="0" smtClean="0">
                 <a:solidFill>
                   <a:schemeClr val="tx1"/>
                 </a:solidFill>
@@ -650,6 +638,67 @@
                 <a:cs typeface="+mn-cs"/>
               </a:rPr>
               <a:t> 21.4 (2016): 1533-1578.</a:t>
+            </a:r>
+          </a:p>
+          <a:p>
+            <a:pPr lvl="0">
+              <a:spcBef>
+                <a:spcPts val="0"/>
+              </a:spcBef>
+              <a:buNone/>
+            </a:pPr>
+            <a:endParaRPr lang="en-US" sz="1100" b="0" i="0" kern="1200" dirty="0" smtClean="0">
+              <a:solidFill>
+                <a:schemeClr val="tx1"/>
+              </a:solidFill>
+              <a:effectLst/>
+              <a:latin typeface="+mn-lt"/>
+              <a:ea typeface="+mn-ea"/>
+              <a:cs typeface="+mn-cs"/>
+            </a:endParaRPr>
+          </a:p>
+          <a:p>
+            <a:pPr lvl="0">
+              <a:spcBef>
+                <a:spcPts val="0"/>
+              </a:spcBef>
+              <a:buNone/>
+            </a:pPr>
+            <a:r>
+              <a:rPr lang="en-US" dirty="0" smtClean="0"/>
+              <a:t>@article{jonsson2016automated, title={Automated bug assignment: Ensemble-based machine learning in large scale industrial contexts}, author={</a:t>
+            </a:r>
+            <a:r>
+              <a:rPr lang="en-US" dirty="0" err="1" smtClean="0"/>
+              <a:t>Jonsson</a:t>
+            </a:r>
+            <a:r>
+              <a:rPr lang="en-US" dirty="0" smtClean="0"/>
+              <a:t>, Leif and Borg, Markus and Broman, David and </a:t>
+            </a:r>
+            <a:r>
+              <a:rPr lang="en-US" dirty="0" err="1" smtClean="0"/>
+              <a:t>Sandahl</a:t>
+            </a:r>
+            <a:r>
+              <a:rPr lang="en-US" dirty="0" smtClean="0"/>
+              <a:t>, Kristian and </a:t>
+            </a:r>
+            <a:r>
+              <a:rPr lang="en-US" dirty="0" err="1" smtClean="0"/>
+              <a:t>Eldh</a:t>
+            </a:r>
+            <a:r>
+              <a:rPr lang="en-US" dirty="0" smtClean="0"/>
+              <a:t>, Sigrid and </a:t>
+            </a:r>
+            <a:r>
+              <a:rPr lang="en-US" dirty="0" err="1" smtClean="0"/>
+              <a:t>Runeson</a:t>
+            </a:r>
+            <a:r>
+              <a:rPr lang="en-US" smtClean="0"/>
+              <a:t>, Per}, journal={Empirical Software Engineering}, volume={21}, number={4}, pages={1533--1578}, year={2016}, publisher={Springer} }</a:t>
             </a:r>
             <a:endParaRPr lang="sv" dirty="0"/>
           </a:p>

</xml_diff>